<commit_message>
add slide and vedio
</commit_message>
<xml_diff>
--- a/Documentation/Slide deck intro.pptx
+++ b/Documentation/Slide deck intro.pptx
@@ -312,7 +312,7 @@
           <a:p>
             <a:fld id="{6A4B53A7-3209-46A6-9454-F38EAC8F11E7}" type="datetimeFigureOut">
               <a:rPr lang="en-US" smtClean="0"/>
-              <a:t>10/25/2020</a:t>
+              <a:t>11/27/2020</a:t>
             </a:fld>
             <a:endParaRPr lang="en-US"/>
           </a:p>
@@ -502,7 +502,7 @@
           <a:p>
             <a:fld id="{6A4B53A7-3209-46A6-9454-F38EAC8F11E7}" type="datetimeFigureOut">
               <a:rPr lang="en-US" smtClean="0"/>
-              <a:t>10/25/2020</a:t>
+              <a:t>11/27/2020</a:t>
             </a:fld>
             <a:endParaRPr lang="en-US"/>
           </a:p>
@@ -682,7 +682,7 @@
           <a:p>
             <a:fld id="{6A4B53A7-3209-46A6-9454-F38EAC8F11E7}" type="datetimeFigureOut">
               <a:rPr lang="en-US" smtClean="0"/>
-              <a:t>10/25/2020</a:t>
+              <a:t>11/27/2020</a:t>
             </a:fld>
             <a:endParaRPr lang="en-US"/>
           </a:p>
@@ -852,7 +852,7 @@
           <a:p>
             <a:fld id="{6A4B53A7-3209-46A6-9454-F38EAC8F11E7}" type="datetimeFigureOut">
               <a:rPr lang="en-US" smtClean="0"/>
-              <a:t>10/25/2020</a:t>
+              <a:t>11/27/2020</a:t>
             </a:fld>
             <a:endParaRPr lang="en-US"/>
           </a:p>
@@ -1108,7 +1108,7 @@
           <a:p>
             <a:fld id="{6A4B53A7-3209-46A6-9454-F38EAC8F11E7}" type="datetimeFigureOut">
               <a:rPr lang="en-US" smtClean="0"/>
-              <a:t>10/25/2020</a:t>
+              <a:t>11/27/2020</a:t>
             </a:fld>
             <a:endParaRPr lang="en-US"/>
           </a:p>
@@ -1396,7 +1396,7 @@
           <a:p>
             <a:fld id="{6A4B53A7-3209-46A6-9454-F38EAC8F11E7}" type="datetimeFigureOut">
               <a:rPr lang="en-US" smtClean="0"/>
-              <a:t>10/25/2020</a:t>
+              <a:t>11/27/2020</a:t>
             </a:fld>
             <a:endParaRPr lang="en-US"/>
           </a:p>
@@ -1834,7 +1834,7 @@
           <a:p>
             <a:fld id="{6A4B53A7-3209-46A6-9454-F38EAC8F11E7}" type="datetimeFigureOut">
               <a:rPr lang="en-US" smtClean="0"/>
-              <a:t>10/25/2020</a:t>
+              <a:t>11/27/2020</a:t>
             </a:fld>
             <a:endParaRPr lang="en-US"/>
           </a:p>
@@ -1952,7 +1952,7 @@
           <a:p>
             <a:fld id="{6A4B53A7-3209-46A6-9454-F38EAC8F11E7}" type="datetimeFigureOut">
               <a:rPr lang="en-US" smtClean="0"/>
-              <a:t>10/25/2020</a:t>
+              <a:t>11/27/2020</a:t>
             </a:fld>
             <a:endParaRPr lang="en-US"/>
           </a:p>
@@ -2047,7 +2047,7 @@
           <a:p>
             <a:fld id="{6A4B53A7-3209-46A6-9454-F38EAC8F11E7}" type="datetimeFigureOut">
               <a:rPr lang="en-US" smtClean="0"/>
-              <a:t>10/25/2020</a:t>
+              <a:t>11/27/2020</a:t>
             </a:fld>
             <a:endParaRPr lang="en-US"/>
           </a:p>
@@ -2403,7 +2403,7 @@
           <a:p>
             <a:fld id="{6A4B53A7-3209-46A6-9454-F38EAC8F11E7}" type="datetimeFigureOut">
               <a:rPr lang="en-US" smtClean="0"/>
-              <a:t>10/25/2020</a:t>
+              <a:t>11/27/2020</a:t>
             </a:fld>
             <a:endParaRPr lang="en-US"/>
           </a:p>
@@ -2719,7 +2719,7 @@
           <a:p>
             <a:fld id="{6A4B53A7-3209-46A6-9454-F38EAC8F11E7}" type="datetimeFigureOut">
               <a:rPr lang="en-US" smtClean="0"/>
-              <a:t>10/25/2020</a:t>
+              <a:t>11/27/2020</a:t>
             </a:fld>
             <a:endParaRPr lang="en-US"/>
           </a:p>
@@ -2953,7 +2953,7 @@
             <a:fld id="{6A4B53A7-3209-46A6-9454-F38EAC8F11E7}" type="datetimeFigureOut">
               <a:rPr lang="en-US" smtClean="0"/>
               <a:pPr/>
-              <a:t>10/25/2020</a:t>
+              <a:t>11/27/2020</a:t>
             </a:fld>
             <a:endParaRPr lang="en-US" dirty="0"/>
           </a:p>
@@ -3437,7 +3437,7 @@
               </a:spcAft>
             </a:pPr>
             <a:r>
-              <a:rPr lang="en-US" sz="3800" b="1" i="0" kern="1200" cap="all" baseline="0" dirty="0">
+              <a:rPr lang="en-US" sz="3800" b="1" cap="all" dirty="0">
                 <a:solidFill>
                   <a:schemeClr val="bg1"/>
                 </a:solidFill>
@@ -3446,7 +3446,7 @@
                 <a:cs typeface="+mj-cs"/>
                 <a:hlinkClick r:id="rId2" action="ppaction://hlinkfile"/>
               </a:rPr>
-              <a:t>Assignment 2</a:t>
+              <a:t>Assignment 3</a:t>
             </a:r>
             <a:r>
               <a:rPr lang="en-US" sz="3800" b="1" i="0" kern="1200" cap="all" baseline="0" dirty="0">
@@ -3481,7 +3481,31 @@
                 <a:ea typeface="+mj-ea"/>
                 <a:cs typeface="+mj-cs"/>
               </a:rPr>
-              <a:t>Projectile Motion, Circular Motion, Free body diagrams and Newton's Laws</a:t>
+              <a:t>2D Collision Detection </a:t>
+            </a:r>
+          </a:p>
+          <a:p>
+            <a:pPr algn="r">
+              <a:lnSpc>
+                <a:spcPct val="90000"/>
+              </a:lnSpc>
+              <a:spcBef>
+                <a:spcPct val="0"/>
+              </a:spcBef>
+              <a:spcAft>
+                <a:spcPts val="600"/>
+              </a:spcAft>
+            </a:pPr>
+            <a:r>
+              <a:rPr lang="en-US" sz="3800" b="1" i="0" kern="1200" cap="all" baseline="0" dirty="0">
+                <a:solidFill>
+                  <a:schemeClr val="bg1"/>
+                </a:solidFill>
+                <a:latin typeface="+mj-lt"/>
+                <a:ea typeface="+mj-ea"/>
+                <a:cs typeface="+mj-cs"/>
+              </a:rPr>
+              <a:t>and response</a:t>
             </a:r>
           </a:p>
         </p:txBody>

</xml_diff>